<commit_message>
create ind weed fig, more rearranging of folder
</commit_message>
<xml_diff>
--- a/make-figs/i-give-up.pptx
+++ b/make-figs/i-give-up.pptx
@@ -6,6 +6,7 @@
   </p:sldMasterIdLst>
   <p:sldIdLst>
     <p:sldId id="256" r:id="rId2"/>
+    <p:sldId id="257" r:id="rId3"/>
   </p:sldIdLst>
   <p:sldSz cx="12192000" cy="6858000"/>
   <p:notesSz cx="6858000" cy="9144000"/>
@@ -104,6 +105,11 @@
       </a:defRPr>
     </a:lvl9pPr>
   </p:defaultTextStyle>
+  <p:extLst>
+    <p:ext uri="{EFAFB233-063F-42B5-8137-9DF3F51BA10A}">
+      <p15:sldGuideLst xmlns:p15="http://schemas.microsoft.com/office/powerpoint/2012/main"/>
+    </p:ext>
+  </p:extLst>
 </p:presentation>
 </file>
 
@@ -254,7 +260,7 @@
           <a:p>
             <a:fld id="{0B215472-66AF-44EB-B1E8-8A4F61F40160}" type="datetimeFigureOut">
               <a:rPr lang="en-US" smtClean="0"/>
-              <a:t>5/8/2020</a:t>
+              <a:t>5/13/2020</a:t>
             </a:fld>
             <a:endParaRPr lang="en-US"/>
           </a:p>
@@ -452,7 +458,7 @@
           <a:p>
             <a:fld id="{0B215472-66AF-44EB-B1E8-8A4F61F40160}" type="datetimeFigureOut">
               <a:rPr lang="en-US" smtClean="0"/>
-              <a:t>5/8/2020</a:t>
+              <a:t>5/13/2020</a:t>
             </a:fld>
             <a:endParaRPr lang="en-US"/>
           </a:p>
@@ -660,7 +666,7 @@
           <a:p>
             <a:fld id="{0B215472-66AF-44EB-B1E8-8A4F61F40160}" type="datetimeFigureOut">
               <a:rPr lang="en-US" smtClean="0"/>
-              <a:t>5/8/2020</a:t>
+              <a:t>5/13/2020</a:t>
             </a:fld>
             <a:endParaRPr lang="en-US"/>
           </a:p>
@@ -858,7 +864,7 @@
           <a:p>
             <a:fld id="{0B215472-66AF-44EB-B1E8-8A4F61F40160}" type="datetimeFigureOut">
               <a:rPr lang="en-US" smtClean="0"/>
-              <a:t>5/8/2020</a:t>
+              <a:t>5/13/2020</a:t>
             </a:fld>
             <a:endParaRPr lang="en-US"/>
           </a:p>
@@ -1133,7 +1139,7 @@
           <a:p>
             <a:fld id="{0B215472-66AF-44EB-B1E8-8A4F61F40160}" type="datetimeFigureOut">
               <a:rPr lang="en-US" smtClean="0"/>
-              <a:t>5/8/2020</a:t>
+              <a:t>5/13/2020</a:t>
             </a:fld>
             <a:endParaRPr lang="en-US"/>
           </a:p>
@@ -1398,7 +1404,7 @@
           <a:p>
             <a:fld id="{0B215472-66AF-44EB-B1E8-8A4F61F40160}" type="datetimeFigureOut">
               <a:rPr lang="en-US" smtClean="0"/>
-              <a:t>5/8/2020</a:t>
+              <a:t>5/13/2020</a:t>
             </a:fld>
             <a:endParaRPr lang="en-US"/>
           </a:p>
@@ -1810,7 +1816,7 @@
           <a:p>
             <a:fld id="{0B215472-66AF-44EB-B1E8-8A4F61F40160}" type="datetimeFigureOut">
               <a:rPr lang="en-US" smtClean="0"/>
-              <a:t>5/8/2020</a:t>
+              <a:t>5/13/2020</a:t>
             </a:fld>
             <a:endParaRPr lang="en-US"/>
           </a:p>
@@ -1951,7 +1957,7 @@
           <a:p>
             <a:fld id="{0B215472-66AF-44EB-B1E8-8A4F61F40160}" type="datetimeFigureOut">
               <a:rPr lang="en-US" smtClean="0"/>
-              <a:t>5/8/2020</a:t>
+              <a:t>5/13/2020</a:t>
             </a:fld>
             <a:endParaRPr lang="en-US"/>
           </a:p>
@@ -2064,7 +2070,7 @@
           <a:p>
             <a:fld id="{0B215472-66AF-44EB-B1E8-8A4F61F40160}" type="datetimeFigureOut">
               <a:rPr lang="en-US" smtClean="0"/>
-              <a:t>5/8/2020</a:t>
+              <a:t>5/13/2020</a:t>
             </a:fld>
             <a:endParaRPr lang="en-US"/>
           </a:p>
@@ -2375,7 +2381,7 @@
           <a:p>
             <a:fld id="{0B215472-66AF-44EB-B1E8-8A4F61F40160}" type="datetimeFigureOut">
               <a:rPr lang="en-US" smtClean="0"/>
-              <a:t>5/8/2020</a:t>
+              <a:t>5/13/2020</a:t>
             </a:fld>
             <a:endParaRPr lang="en-US"/>
           </a:p>
@@ -2663,7 +2669,7 @@
           <a:p>
             <a:fld id="{0B215472-66AF-44EB-B1E8-8A4F61F40160}" type="datetimeFigureOut">
               <a:rPr lang="en-US" smtClean="0"/>
-              <a:t>5/8/2020</a:t>
+              <a:t>5/13/2020</a:t>
             </a:fld>
             <a:endParaRPr lang="en-US"/>
           </a:p>
@@ -2904,7 +2910,7 @@
           <a:p>
             <a:fld id="{0B215472-66AF-44EB-B1E8-8A4F61F40160}" type="datetimeFigureOut">
               <a:rPr lang="en-US" smtClean="0"/>
-              <a:t>5/8/2020</a:t>
+              <a:t>5/13/2020</a:t>
             </a:fld>
             <a:endParaRPr lang="en-US"/>
           </a:p>
@@ -3321,12 +3327,114 @@
           <a:chExt cx="0" cy="0"/>
         </a:xfrm>
       </p:grpSpPr>
+      <p:pic>
+        <p:nvPicPr>
+          <p:cNvPr id="5" name="Picture 4" descr="A close up of a map&#10;&#10;Description automatically generated">
+            <a:extLst>
+              <a:ext uri="{FF2B5EF4-FFF2-40B4-BE49-F238E27FC236}">
+                <a16:creationId xmlns:a16="http://schemas.microsoft.com/office/drawing/2014/main" id="{49B85E9A-7512-45A8-81A9-A660480B5AF3}"/>
+              </a:ext>
+            </a:extLst>
+          </p:cNvPr>
+          <p:cNvPicPr>
+            <a:picLocks noChangeAspect="1"/>
+          </p:cNvPicPr>
+          <p:nvPr/>
+        </p:nvPicPr>
+        <p:blipFill>
+          <a:blip r:embed="rId2">
+            <a:extLst>
+              <a:ext uri="{28A0092B-C50C-407E-A947-70E740481C1C}">
+                <a14:useLocalDpi xmlns:a14="http://schemas.microsoft.com/office/drawing/2010/main" val="0"/>
+              </a:ext>
+            </a:extLst>
+          </a:blip>
+          <a:stretch>
+            <a:fillRect/>
+          </a:stretch>
+        </p:blipFill>
+        <p:spPr>
+          <a:xfrm>
+            <a:off x="1976619" y="1019551"/>
+            <a:ext cx="8238761" cy="4818898"/>
+          </a:xfrm>
+          <a:prstGeom prst="rect">
+            <a:avLst/>
+          </a:prstGeom>
+        </p:spPr>
+      </p:pic>
+      <p:pic>
+        <p:nvPicPr>
+          <p:cNvPr id="3" name="Picture 2" descr="A screenshot of a cell phone&#10;&#10;Description automatically generated">
+            <a:extLst>
+              <a:ext uri="{FF2B5EF4-FFF2-40B4-BE49-F238E27FC236}">
+                <a16:creationId xmlns:a16="http://schemas.microsoft.com/office/drawing/2014/main" id="{DA41861A-A2A1-4163-88EA-418EFF9524CA}"/>
+              </a:ext>
+            </a:extLst>
+          </p:cNvPr>
+          <p:cNvPicPr>
+            <a:picLocks noChangeAspect="1"/>
+          </p:cNvPicPr>
+          <p:nvPr/>
+        </p:nvPicPr>
+        <p:blipFill>
+          <a:blip r:embed="rId3">
+            <a:extLst>
+              <a:ext uri="{28A0092B-C50C-407E-A947-70E740481C1C}">
+                <a14:useLocalDpi xmlns:a14="http://schemas.microsoft.com/office/drawing/2010/main" val="0"/>
+              </a:ext>
+            </a:extLst>
+          </a:blip>
+          <a:stretch>
+            <a:fillRect/>
+          </a:stretch>
+        </p:blipFill>
+        <p:spPr>
+          <a:xfrm>
+            <a:off x="6891281" y="3326862"/>
+            <a:ext cx="2689208" cy="2452936"/>
+          </a:xfrm>
+          <a:prstGeom prst="rect">
+            <a:avLst/>
+          </a:prstGeom>
+        </p:spPr>
+      </p:pic>
+    </p:spTree>
+    <p:extLst>
+      <p:ext uri="{BB962C8B-B14F-4D97-AF65-F5344CB8AC3E}">
+        <p14:creationId xmlns:p14="http://schemas.microsoft.com/office/powerpoint/2010/main" val="2547577030"/>
+      </p:ext>
+    </p:extLst>
+  </p:cSld>
+  <p:clrMapOvr>
+    <a:masterClrMapping/>
+  </p:clrMapOvr>
+</p:sld>
+</file>
+
+<file path=ppt/slides/slide2.xml><?xml version="1.0" encoding="utf-8"?>
+<p:sld xmlns:a="http://schemas.openxmlformats.org/drawingml/2006/main" xmlns:r="http://schemas.openxmlformats.org/officeDocument/2006/relationships" xmlns:p="http://schemas.openxmlformats.org/presentationml/2006/main">
+  <p:cSld>
+    <p:spTree>
+      <p:nvGrpSpPr>
+        <p:cNvPr id="1" name=""/>
+        <p:cNvGrpSpPr/>
+        <p:nvPr/>
+      </p:nvGrpSpPr>
+      <p:grpSpPr>
+        <a:xfrm>
+          <a:off x="0" y="0"/>
+          <a:ext cx="0" cy="0"/>
+          <a:chOff x="0" y="0"/>
+          <a:chExt cx="0" cy="0"/>
+        </a:xfrm>
+      </p:grpSpPr>
       <p:grpSp>
         <p:nvGrpSpPr>
-          <p:cNvPr id="8" name="Group 7">
-            <a:extLst>
-              <a:ext uri="{FF2B5EF4-FFF2-40B4-BE49-F238E27FC236}">
-                <a16:creationId xmlns:a16="http://schemas.microsoft.com/office/drawing/2014/main" id="{6BD2BB47-B7D5-4DDD-8BC6-5F59E1C5B8EB}"/>
+          <p:cNvPr id="15" name="Group 14">
+            <a:extLst>
+              <a:ext uri="{FF2B5EF4-FFF2-40B4-BE49-F238E27FC236}">
+                <a16:creationId xmlns:a16="http://schemas.microsoft.com/office/drawing/2014/main" id="{896398C3-4014-4F0D-9E21-0BDC7E07B869}"/>
               </a:ext>
             </a:extLst>
           </p:cNvPr>
@@ -3335,18 +3443,18 @@
         </p:nvGrpSpPr>
         <p:grpSpPr>
           <a:xfrm>
-            <a:off x="1976619" y="1019551"/>
-            <a:ext cx="8238761" cy="4818898"/>
-            <a:chOff x="1976619" y="1019551"/>
-            <a:chExt cx="8238761" cy="4818898"/>
+            <a:off x="1306879" y="1136280"/>
+            <a:ext cx="7852016" cy="5147790"/>
+            <a:chOff x="1306879" y="1136280"/>
+            <a:chExt cx="7852016" cy="5147790"/>
           </a:xfrm>
         </p:grpSpPr>
         <p:pic>
           <p:nvPicPr>
-            <p:cNvPr id="5" name="Picture 4" descr="A close up of a map&#10;&#10;Description automatically generated">
+            <p:cNvPr id="14" name="Picture 13" descr="A screenshot of a cell phone screen with text&#10;&#10;Description automatically generated">
               <a:extLst>
                 <a:ext uri="{FF2B5EF4-FFF2-40B4-BE49-F238E27FC236}">
-                  <a16:creationId xmlns:a16="http://schemas.microsoft.com/office/drawing/2014/main" id="{49B85E9A-7512-45A8-81A9-A660480B5AF3}"/>
+                  <a16:creationId xmlns:a16="http://schemas.microsoft.com/office/drawing/2014/main" id="{ABE21012-BFDD-49A8-B3D5-361B11A024A2}"/>
                 </a:ext>
               </a:extLst>
             </p:cNvPr>
@@ -3355,7 +3463,7 @@
             </p:cNvPicPr>
             <p:nvPr/>
           </p:nvPicPr>
-          <p:blipFill>
+          <p:blipFill rotWithShape="1">
             <a:blip r:embed="rId2">
               <a:extLst>
                 <a:ext uri="{28A0092B-C50C-407E-A947-70E740481C1C}">
@@ -3363,14 +3471,13 @@
                 </a:ext>
               </a:extLst>
             </a:blip>
-            <a:stretch>
-              <a:fillRect/>
-            </a:stretch>
+            <a:srcRect l="54456"/>
+            <a:stretch/>
           </p:blipFill>
           <p:spPr>
             <a:xfrm>
-              <a:off x="1976619" y="1019551"/>
-              <a:ext cx="8238761" cy="4818898"/>
+              <a:off x="1306879" y="1136280"/>
+              <a:ext cx="3413540" cy="4770130"/>
             </a:xfrm>
             <a:prstGeom prst="rect">
               <a:avLst/>
@@ -3379,10 +3486,10 @@
         </p:pic>
         <p:pic>
           <p:nvPicPr>
-            <p:cNvPr id="7" name="Picture 6" descr="A screenshot of a cell phone&#10;&#10;Description automatically generated">
+            <p:cNvPr id="4" name="Picture 3" descr="A screenshot of a cell phone&#10;&#10;Description automatically generated">
               <a:extLst>
                 <a:ext uri="{FF2B5EF4-FFF2-40B4-BE49-F238E27FC236}">
-                  <a16:creationId xmlns:a16="http://schemas.microsoft.com/office/drawing/2014/main" id="{DC657E72-D53B-48B5-93DE-B6ED0B899906}"/>
+                  <a16:creationId xmlns:a16="http://schemas.microsoft.com/office/drawing/2014/main" id="{752D1B6B-9E1F-4CD7-BF8D-BC85F8D608A9}"/>
                 </a:ext>
               </a:extLst>
             </p:cNvPr>
@@ -3405,8 +3512,43 @@
           </p:blipFill>
           <p:spPr>
             <a:xfrm>
-              <a:off x="7044342" y="3429000"/>
-              <a:ext cx="2495309" cy="2182914"/>
+              <a:off x="1545747" y="3565192"/>
+              <a:ext cx="2689208" cy="2452936"/>
+            </a:xfrm>
+            <a:prstGeom prst="rect">
+              <a:avLst/>
+            </a:prstGeom>
+          </p:spPr>
+        </p:pic>
+        <p:pic>
+          <p:nvPicPr>
+            <p:cNvPr id="11" name="Picture 10" descr="A close up of a map&#10;&#10;Description automatically generated">
+              <a:extLst>
+                <a:ext uri="{FF2B5EF4-FFF2-40B4-BE49-F238E27FC236}">
+                  <a16:creationId xmlns:a16="http://schemas.microsoft.com/office/drawing/2014/main" id="{2157379D-A658-420A-8E31-C120875AF743}"/>
+                </a:ext>
+              </a:extLst>
+            </p:cNvPr>
+            <p:cNvPicPr>
+              <a:picLocks noChangeAspect="1"/>
+            </p:cNvPicPr>
+            <p:nvPr/>
+          </p:nvPicPr>
+          <p:blipFill rotWithShape="1">
+            <a:blip r:embed="rId4">
+              <a:extLst>
+                <a:ext uri="{28A0092B-C50C-407E-A947-70E740481C1C}">
+                  <a14:useLocalDpi xmlns:a14="http://schemas.microsoft.com/office/drawing/2010/main" val="0"/>
+                </a:ext>
+              </a:extLst>
+            </a:blip>
+            <a:srcRect r="46301"/>
+            <a:stretch/>
+          </p:blipFill>
+          <p:spPr>
+            <a:xfrm>
+              <a:off x="4486349" y="1194648"/>
+              <a:ext cx="4672546" cy="5089422"/>
             </a:xfrm>
             <a:prstGeom prst="rect">
               <a:avLst/>
@@ -3417,7 +3559,7 @@
     </p:spTree>
     <p:extLst>
       <p:ext uri="{BB962C8B-B14F-4D97-AF65-F5344CB8AC3E}">
-        <p14:creationId xmlns:p14="http://schemas.microsoft.com/office/powerpoint/2010/main" val="2547577030"/>
+        <p14:creationId xmlns:p14="http://schemas.microsoft.com/office/powerpoint/2010/main" val="1129175822"/>
       </p:ext>
     </p:extLst>
   </p:cSld>

</xml_diff>